<commit_message>
tweaked PPT, added a consolidated writing file to avoid repetition in main.py
</commit_message>
<xml_diff>
--- a/A3_Analysis.pptx
+++ b/A3_Analysis.pptx
@@ -6152,7 +6152,7 @@
           <a:p>
             <a:fld id="{C764DE79-268F-4C1A-8933-263129D2AF90}" type="datetimeFigureOut">
               <a:rPr lang="en-US" smtClean="0"/>
-              <a:t>12/13/2020</a:t>
+              <a:t>12/13/20</a:t>
             </a:fld>
             <a:endParaRPr lang="en-US"/>
           </a:p>
@@ -6320,7 +6320,7 @@
           <a:p>
             <a:fld id="{C764DE79-268F-4C1A-8933-263129D2AF90}" type="datetimeFigureOut">
               <a:rPr lang="en-US" smtClean="0"/>
-              <a:t>12/13/2020</a:t>
+              <a:t>12/13/20</a:t>
             </a:fld>
             <a:endParaRPr lang="en-US"/>
           </a:p>
@@ -6498,7 +6498,7 @@
           <a:p>
             <a:fld id="{C764DE79-268F-4C1A-8933-263129D2AF90}" type="datetimeFigureOut">
               <a:rPr lang="en-US" smtClean="0"/>
-              <a:t>12/13/2020</a:t>
+              <a:t>12/13/20</a:t>
             </a:fld>
             <a:endParaRPr lang="en-US"/>
           </a:p>
@@ -6666,7 +6666,7 @@
           <a:p>
             <a:fld id="{C764DE79-268F-4C1A-8933-263129D2AF90}" type="datetimeFigureOut">
               <a:rPr lang="en-US" smtClean="0"/>
-              <a:t>12/13/2020</a:t>
+              <a:t>12/13/20</a:t>
             </a:fld>
             <a:endParaRPr lang="en-US"/>
           </a:p>
@@ -6933,7 +6933,7 @@
           <a:p>
             <a:fld id="{C764DE79-268F-4C1A-8933-263129D2AF90}" type="datetimeFigureOut">
               <a:rPr lang="en-US" smtClean="0"/>
-              <a:t>12/13/2020</a:t>
+              <a:t>12/13/20</a:t>
             </a:fld>
             <a:endParaRPr lang="en-US"/>
           </a:p>
@@ -7162,7 +7162,7 @@
           <a:p>
             <a:fld id="{C764DE79-268F-4C1A-8933-263129D2AF90}" type="datetimeFigureOut">
               <a:rPr lang="en-US" smtClean="0"/>
-              <a:t>12/13/2020</a:t>
+              <a:t>12/13/20</a:t>
             </a:fld>
             <a:endParaRPr lang="en-US"/>
           </a:p>
@@ -7519,7 +7519,7 @@
           <a:p>
             <a:fld id="{C764DE79-268F-4C1A-8933-263129D2AF90}" type="datetimeFigureOut">
               <a:rPr lang="en-US" smtClean="0"/>
-              <a:t>12/13/2020</a:t>
+              <a:t>12/13/20</a:t>
             </a:fld>
             <a:endParaRPr lang="en-US"/>
           </a:p>
@@ -7658,7 +7658,7 @@
           <a:p>
             <a:fld id="{C764DE79-268F-4C1A-8933-263129D2AF90}" type="datetimeFigureOut">
               <a:rPr lang="en-US" smtClean="0"/>
-              <a:t>12/13/2020</a:t>
+              <a:t>12/13/20</a:t>
             </a:fld>
             <a:endParaRPr lang="en-US"/>
           </a:p>
@@ -7753,7 +7753,7 @@
           <a:p>
             <a:fld id="{C764DE79-268F-4C1A-8933-263129D2AF90}" type="datetimeFigureOut">
               <a:rPr lang="en-US" smtClean="0"/>
-              <a:t>12/13/2020</a:t>
+              <a:t>12/13/20</a:t>
             </a:fld>
             <a:endParaRPr lang="en-US"/>
           </a:p>
@@ -8108,7 +8108,7 @@
           <a:p>
             <a:fld id="{C764DE79-268F-4C1A-8933-263129D2AF90}" type="datetimeFigureOut">
               <a:rPr lang="en-US" smtClean="0"/>
-              <a:t>12/13/2020</a:t>
+              <a:t>12/13/20</a:t>
             </a:fld>
             <a:endParaRPr lang="en-US"/>
           </a:p>
@@ -8463,7 +8463,7 @@
           <a:p>
             <a:fld id="{C764DE79-268F-4C1A-8933-263129D2AF90}" type="datetimeFigureOut">
               <a:rPr lang="en-US" smtClean="0"/>
-              <a:t>12/13/2020</a:t>
+              <a:t>12/13/20</a:t>
             </a:fld>
             <a:endParaRPr lang="en-US"/>
           </a:p>
@@ -8703,7 +8703,7 @@
           <a:p>
             <a:fld id="{C764DE79-268F-4C1A-8933-263129D2AF90}" type="datetimeFigureOut">
               <a:rPr lang="en-US" smtClean="0"/>
-              <a:t>12/13/2020</a:t>
+              <a:t>12/13/20</a:t>
             </a:fld>
             <a:endParaRPr lang="en-US"/>
           </a:p>
@@ -12575,7 +12575,7 @@
             </a:pPr>
             <a:r>
               <a:rPr lang="en-US" dirty="0"/>
-              <a:t>The TestingTweet object holds a TweetWord array and yes/no probabilities in addition to parameters inherited from its parent (Tweet)</a:t>
+              <a:t>The TestingTweet object holds a TweetWord list and yes/no probabilities in addition to parameters inherited from its parent (Tweet)</a:t>
             </a:r>
           </a:p>
           <a:p>
@@ -12992,7 +12992,7 @@
         <p:spPr>
           <a:xfrm>
             <a:off x="5010190" y="320891"/>
-            <a:ext cx="6825915" cy="6324808"/>
+            <a:ext cx="6825915" cy="6832640"/>
           </a:xfrm>
           <a:prstGeom prst="rect">
             <a:avLst/>
@@ -13023,7 +13023,7 @@
             </a:r>
             <a:r>
               <a:rPr lang="en-US" sz="1750" dirty="0"/>
-              <a:t>() DataSet method uses the previously calculated word probabilities to go through the testing documents list, and passing down the yes/no class priors and going through the TestingTweet word array to calculate the yes/no probabilities of a TestingTweet.</a:t>
+              <a:t>() DataSet method uses the previously calculated word probabilities to go through the testing documents list, and passing down the yes/no class priors and going through the TestingTweet word list to calculate the yes/no probabilities of a TestingTweet.</a:t>
             </a:r>
           </a:p>
           <a:p>
@@ -13034,7 +13034,19 @@
             </a:pPr>
             <a:r>
               <a:rPr lang="en-US" sz="1750" dirty="0"/>
-              <a:t>6. The </a:t>
+              <a:t>6. </a:t>
+            </a:r>
+            <a:r>
+              <a:rPr lang="en-US" dirty="0" err="1"/>
+              <a:t>write_trace_and_eval_files</a:t>
+            </a:r>
+            <a:r>
+              <a:rPr lang="en-US" dirty="0"/>
+              <a:t>() function traverses </a:t>
+            </a:r>
+            <a:r>
+              <a:rPr lang="en-US" sz="1750" dirty="0"/>
+              <a:t>the </a:t>
             </a:r>
             <a:r>
               <a:rPr lang="en-US" sz="1750" dirty="0" err="1"/>
@@ -13042,7 +13054,7 @@
             </a:r>
             <a:r>
               <a:rPr lang="en-US" sz="1750" dirty="0"/>
-              <a:t> testing document’s list is traversed and the highest yes/no probability determines the predicted label.</a:t>
+              <a:t> testing documents list and the highest yes/no probability determines the predicted label.</a:t>
             </a:r>
           </a:p>
           <a:p>
@@ -13118,7 +13130,7 @@
             </a:r>
             <a:r>
               <a:rPr lang="en-US" sz="1750" dirty="0"/>
-              <a:t> array and deletes words with less than 2 usage, and updates all the other metrics correctly. </a:t>
+              <a:t> list and deletes words with less than 2 usage, and updates all the other metrics correctly. </a:t>
             </a:r>
           </a:p>
           <a:p>

</xml_diff>

<commit_message>
more comments, and finishing touches
</commit_message>
<xml_diff>
--- a/A3_Analysis.pptx
+++ b/A3_Analysis.pptx
@@ -10864,7 +10864,15 @@
           <a:p>
             <a:r>
               <a:rPr lang="en-US" dirty="0"/>
-              <a:t>Harsher filtering also had slightly negative effects with OV</a:t>
+              <a:t>Harsher filtering also had slightly </a:t>
+            </a:r>
+            <a:r>
+              <a:rPr lang="en-US" b="1" dirty="0"/>
+              <a:t>negative</a:t>
+            </a:r>
+            <a:r>
+              <a:rPr lang="en-US" dirty="0"/>
+              <a:t> effects with OV</a:t>
             </a:r>
           </a:p>
         </p:txBody>
@@ -10927,7 +10935,7 @@
           <a:p>
             <a:r>
               <a:rPr lang="en-US" dirty="0"/>
-              <a:t>EFFECTs of Harsher Filtering</a:t>
+              <a:t>EFFECTs of Different Smoothing</a:t>
             </a:r>
             <a:endParaRPr lang="en-CA" dirty="0"/>
           </a:p>
@@ -11558,7 +11566,15 @@
           <a:p>
             <a:r>
               <a:rPr lang="en-US" dirty="0"/>
-              <a:t>0.1 smoothing with FV had slightly negative effects (compared to 0.01 smoothing)</a:t>
+              <a:t>0.1 smoothing with FV had slightly </a:t>
+            </a:r>
+            <a:r>
+              <a:rPr lang="en-US" b="1" dirty="0"/>
+              <a:t>negative</a:t>
+            </a:r>
+            <a:r>
+              <a:rPr lang="en-US" dirty="0"/>
+              <a:t> effects (compared to 0.01 smoothing)</a:t>
             </a:r>
           </a:p>
         </p:txBody>

</xml_diff>